<commit_message>
added the average surface temperature
</commit_message>
<xml_diff>
--- a/presentation/6_TOHOKU_ENG.pptx
+++ b/presentation/6_TOHOKU_ENG.pptx
@@ -20133,6 +20133,162 @@
       </p:grpSpPr>
       <p:sp>
         <p:nvSpPr>
+          <p:cNvPr id="12" name="Rechteck 14"/>
+          <p:cNvSpPr>
+            <a:spLocks noChangeArrowheads="1"/>
+          </p:cNvSpPr>
+          <p:nvPr/>
+        </p:nvSpPr>
+        <p:spPr bwMode="auto">
+          <a:xfrm>
+            <a:off x="283543" y="4674280"/>
+            <a:ext cx="4230241" cy="2067087"/>
+          </a:xfrm>
+          <a:prstGeom prst="rect">
+            <a:avLst/>
+          </a:prstGeom>
+          <a:solidFill>
+            <a:schemeClr val="bg1"/>
+          </a:solidFill>
+          <a:ln>
+            <a:noFill/>
+          </a:ln>
+          <a:extLst>
+            <a:ext uri="{91240B29-F687-4F45-9708-019B960494DF}">
+              <a14:hiddenLine xmlns:a14="http://schemas.microsoft.com/office/drawing/2010/main" w="9525" algn="ctr">
+                <a:solidFill>
+                  <a:srgbClr val="000000"/>
+                </a:solidFill>
+                <a:round/>
+                <a:headEnd/>
+                <a:tailEnd/>
+              </a14:hiddenLine>
+            </a:ext>
+          </a:extLst>
+        </p:spPr>
+        <p:txBody>
+          <a:bodyPr wrap="square">
+            <a:spAutoFit/>
+          </a:bodyPr>
+          <a:lstStyle>
+            <a:lvl1pPr eaLnBrk="0" hangingPunct="0">
+              <a:defRPr kumimoji="1" sz="1600">
+                <a:solidFill>
+                  <a:schemeClr val="tx1"/>
+                </a:solidFill>
+                <a:latin typeface="Arial" charset="0"/>
+                <a:ea typeface="ＭＳ Ｐゴシック" pitchFamily="34" charset="-128"/>
+              </a:defRPr>
+            </a:lvl1pPr>
+            <a:lvl2pPr marL="742950" indent="-285750" eaLnBrk="0" hangingPunct="0">
+              <a:defRPr kumimoji="1" sz="1600">
+                <a:solidFill>
+                  <a:schemeClr val="tx1"/>
+                </a:solidFill>
+                <a:latin typeface="Arial" charset="0"/>
+                <a:ea typeface="ＭＳ Ｐゴシック" pitchFamily="34" charset="-128"/>
+              </a:defRPr>
+            </a:lvl2pPr>
+            <a:lvl3pPr marL="1143000" indent="-228600" eaLnBrk="0" hangingPunct="0">
+              <a:defRPr kumimoji="1" sz="1600">
+                <a:solidFill>
+                  <a:schemeClr val="tx1"/>
+                </a:solidFill>
+                <a:latin typeface="Arial" charset="0"/>
+                <a:ea typeface="ＭＳ Ｐゴシック" pitchFamily="34" charset="-128"/>
+              </a:defRPr>
+            </a:lvl3pPr>
+            <a:lvl4pPr marL="1600200" indent="-228600" eaLnBrk="0" hangingPunct="0">
+              <a:defRPr kumimoji="1" sz="1600">
+                <a:solidFill>
+                  <a:schemeClr val="tx1"/>
+                </a:solidFill>
+                <a:latin typeface="Arial" charset="0"/>
+                <a:ea typeface="ＭＳ Ｐゴシック" pitchFamily="34" charset="-128"/>
+              </a:defRPr>
+            </a:lvl4pPr>
+            <a:lvl5pPr marL="2057400" indent="-228600" eaLnBrk="0" hangingPunct="0">
+              <a:defRPr kumimoji="1" sz="1600">
+                <a:solidFill>
+                  <a:schemeClr val="tx1"/>
+                </a:solidFill>
+                <a:latin typeface="Arial" charset="0"/>
+                <a:ea typeface="ＭＳ Ｐゴシック" pitchFamily="34" charset="-128"/>
+              </a:defRPr>
+            </a:lvl5pPr>
+            <a:lvl6pPr marL="2514600" indent="-228600" eaLnBrk="0" fontAlgn="base" hangingPunct="0">
+              <a:spcBef>
+                <a:spcPct val="0"/>
+              </a:spcBef>
+              <a:spcAft>
+                <a:spcPct val="0"/>
+              </a:spcAft>
+              <a:defRPr kumimoji="1" sz="1600">
+                <a:solidFill>
+                  <a:schemeClr val="tx1"/>
+                </a:solidFill>
+                <a:latin typeface="Arial" charset="0"/>
+                <a:ea typeface="ＭＳ Ｐゴシック" pitchFamily="34" charset="-128"/>
+              </a:defRPr>
+            </a:lvl6pPr>
+            <a:lvl7pPr marL="2971800" indent="-228600" eaLnBrk="0" fontAlgn="base" hangingPunct="0">
+              <a:spcBef>
+                <a:spcPct val="0"/>
+              </a:spcBef>
+              <a:spcAft>
+                <a:spcPct val="0"/>
+              </a:spcAft>
+              <a:defRPr kumimoji="1" sz="1600">
+                <a:solidFill>
+                  <a:schemeClr val="tx1"/>
+                </a:solidFill>
+                <a:latin typeface="Arial" charset="0"/>
+                <a:ea typeface="ＭＳ Ｐゴシック" pitchFamily="34" charset="-128"/>
+              </a:defRPr>
+            </a:lvl7pPr>
+            <a:lvl8pPr marL="3429000" indent="-228600" eaLnBrk="0" fontAlgn="base" hangingPunct="0">
+              <a:spcBef>
+                <a:spcPct val="0"/>
+              </a:spcBef>
+              <a:spcAft>
+                <a:spcPct val="0"/>
+              </a:spcAft>
+              <a:defRPr kumimoji="1" sz="1600">
+                <a:solidFill>
+                  <a:schemeClr val="tx1"/>
+                </a:solidFill>
+                <a:latin typeface="Arial" charset="0"/>
+                <a:ea typeface="ＭＳ Ｐゴシック" pitchFamily="34" charset="-128"/>
+              </a:defRPr>
+            </a:lvl8pPr>
+            <a:lvl9pPr marL="3886200" indent="-228600" eaLnBrk="0" fontAlgn="base" hangingPunct="0">
+              <a:spcBef>
+                <a:spcPct val="0"/>
+              </a:spcBef>
+              <a:spcAft>
+                <a:spcPct val="0"/>
+              </a:spcAft>
+              <a:defRPr kumimoji="1" sz="1600">
+                <a:solidFill>
+                  <a:schemeClr val="tx1"/>
+                </a:solidFill>
+                <a:latin typeface="Arial" charset="0"/>
+                <a:ea typeface="ＭＳ Ｐゴシック" pitchFamily="34" charset="-128"/>
+              </a:defRPr>
+            </a:lvl9pPr>
+          </a:lstStyle>
+          <a:p>
+            <a:pPr algn="ctr" eaLnBrk="1" hangingPunct="1">
+              <a:spcBef>
+                <a:spcPct val="50000"/>
+              </a:spcBef>
+            </a:pPr>
+            <a:endParaRPr lang="de-DE" altLang="fr-FR"/>
+          </a:p>
+        </p:txBody>
+      </p:sp>
+      <p:sp>
+        <p:nvSpPr>
           <p:cNvPr id="3" name="Espace réservé du contenu 2"/>
           <p:cNvSpPr>
             <a:spLocks noGrp="1"/>
@@ -20427,8 +20583,8 @@
           </p:nvSpPr>
           <p:spPr bwMode="auto">
             <a:xfrm>
-              <a:off x="5850082" y="4983956"/>
-              <a:ext cx="1295400" cy="685800"/>
+              <a:off x="5738486" y="4983956"/>
+              <a:ext cx="1406996" cy="685800"/>
             </a:xfrm>
             <a:prstGeom prst="rect">
               <a:avLst/>
@@ -20453,7 +20609,7 @@
             </a:extLst>
           </p:spPr>
           <p:txBody>
-            <a:bodyPr>
+            <a:bodyPr wrap="square">
               <a:spAutoFit/>
             </a:bodyPr>
             <a:lstStyle>
@@ -20638,6 +20794,65 @@
           </p:spPr>
         </p:pic>
       </p:grpSp>
+      <p:pic>
+        <p:nvPicPr>
+          <p:cNvPr id="2" name="Image 1"/>
+          <p:cNvPicPr>
+            <a:picLocks noChangeAspect="1"/>
+          </p:cNvPicPr>
+          <p:nvPr/>
+        </p:nvPicPr>
+        <p:blipFill>
+          <a:blip r:embed="rId5" cstate="print">
+            <a:extLst>
+              <a:ext uri="{28A0092B-C50C-407E-A947-70E740481C1C}">
+                <a14:useLocalDpi xmlns:a14="http://schemas.microsoft.com/office/drawing/2010/main" val="0"/>
+              </a:ext>
+            </a:extLst>
+          </a:blip>
+          <a:stretch>
+            <a:fillRect/>
+          </a:stretch>
+        </p:blipFill>
+        <p:spPr>
+          <a:xfrm>
+            <a:off x="5436096" y="4674281"/>
+            <a:ext cx="2934445" cy="2067087"/>
+          </a:xfrm>
+          <a:prstGeom prst="rect">
+            <a:avLst/>
+          </a:prstGeom>
+        </p:spPr>
+      </p:pic>
+      <p:pic>
+        <p:nvPicPr>
+          <p:cNvPr id="5" name="Image 4"/>
+          <p:cNvPicPr>
+            <a:picLocks noChangeAspect="1"/>
+          </p:cNvPicPr>
+          <p:nvPr/>
+        </p:nvPicPr>
+        <p:blipFill rotWithShape="1">
+          <a:blip r:embed="rId6">
+            <a:extLst>
+              <a:ext uri="{28A0092B-C50C-407E-A947-70E740481C1C}">
+                <a14:useLocalDpi xmlns:a14="http://schemas.microsoft.com/office/drawing/2010/main" val="0"/>
+              </a:ext>
+            </a:extLst>
+          </a:blip>
+          <a:srcRect l="4363" t="25998" b="22032"/>
+          <a:stretch/>
+        </p:blipFill>
+        <p:spPr>
+          <a:xfrm>
+            <a:off x="251520" y="1889125"/>
+            <a:ext cx="8745016" cy="2671763"/>
+          </a:xfrm>
+          <a:prstGeom prst="rect">
+            <a:avLst/>
+          </a:prstGeom>
+        </p:spPr>
+      </p:pic>
     </p:spTree>
     <p:extLst>
       <p:ext uri="{BB962C8B-B14F-4D97-AF65-F5344CB8AC3E}">
@@ -21122,6 +21337,36 @@
           <a:xfrm>
             <a:off x="0" y="0"/>
             <a:ext cx="1192549" cy="1196752"/>
+          </a:xfrm>
+          <a:prstGeom prst="rect">
+            <a:avLst/>
+          </a:prstGeom>
+        </p:spPr>
+      </p:pic>
+      <p:pic>
+        <p:nvPicPr>
+          <p:cNvPr id="2" name="Image 1"/>
+          <p:cNvPicPr>
+            <a:picLocks noChangeAspect="1"/>
+          </p:cNvPicPr>
+          <p:nvPr/>
+        </p:nvPicPr>
+        <p:blipFill>
+          <a:blip r:embed="rId3">
+            <a:extLst>
+              <a:ext uri="{28A0092B-C50C-407E-A947-70E740481C1C}">
+                <a14:useLocalDpi xmlns:a14="http://schemas.microsoft.com/office/drawing/2010/main" val="0"/>
+              </a:ext>
+            </a:extLst>
+          </a:blip>
+          <a:stretch>
+            <a:fillRect/>
+          </a:stretch>
+        </p:blipFill>
+        <p:spPr>
+          <a:xfrm>
+            <a:off x="523770" y="2060848"/>
+            <a:ext cx="7740352" cy="4187193"/>
           </a:xfrm>
           <a:prstGeom prst="rect">
             <a:avLst/>

</xml_diff>